<commit_message>
Adicionando Slides do projeto
</commit_message>
<xml_diff>
--- a/Apresentacao Pokestore - Kafka.pptx
+++ b/Apresentacao Pokestore - Kafka.pptx
@@ -120,6 +120,11 @@
       </a:defRPr>
     </a:lvl9pPr>
   </p:defaultTextStyle>
+  <p:extLst>
+    <p:ext uri="{EFAFB233-063F-42B5-8137-9DF3F51BA10A}">
+      <p15:sldGuideLst xmlns:p15="http://schemas.microsoft.com/office/powerpoint/2012/main"/>
+    </p:ext>
+  </p:extLst>
 </p:presentation>
 </file>
 
@@ -40730,7 +40735,7 @@
                 <a:latin typeface="Bahnschrift" pitchFamily="34"/>
                 <a:cs typeface="Tahoma" pitchFamily="2"/>
               </a:rPr>
-              <a:t>Nogez</a:t>
+              <a:t>Noguez</a:t>
             </a:r>
             <a:endParaRPr lang="pt-BR" dirty="0">
               <a:solidFill>
@@ -41327,7 +41332,7 @@
                 <a:spcPts val="0"/>
               </a:spcBef>
             </a:pPr>
-            <a:endParaRPr lang="pt-BR" sz="1400">
+            <a:endParaRPr lang="pt-BR" sz="1400" dirty="0">
               <a:solidFill>
                 <a:srgbClr val="000000"/>
               </a:solidFill>
@@ -41341,7 +41346,7 @@
                 <a:spcPts val="0"/>
               </a:spcBef>
             </a:pPr>
-            <a:endParaRPr lang="pt-BR" sz="1400">
+            <a:endParaRPr lang="pt-BR" sz="1400" dirty="0">
               <a:solidFill>
                 <a:srgbClr val="333333"/>
               </a:solidFill>
@@ -41355,7 +41360,7 @@
                 <a:spcPts val="0"/>
               </a:spcBef>
             </a:pPr>
-            <a:endParaRPr lang="pt-BR" sz="1400">
+            <a:endParaRPr lang="pt-BR" sz="1400" dirty="0">
               <a:solidFill>
                 <a:srgbClr val="333333"/>
               </a:solidFill>
@@ -41369,7 +41374,7 @@
                 <a:spcPts val="0"/>
               </a:spcBef>
             </a:pPr>
-            <a:endParaRPr lang="pt-BR" sz="1800">
+            <a:endParaRPr lang="pt-BR" sz="1800" dirty="0">
               <a:solidFill>
                 <a:srgbClr val="333333"/>
               </a:solidFill>
@@ -41384,14 +41389,34 @@
               </a:spcBef>
             </a:pPr>
             <a:r>
-              <a:rPr lang="pt-BR" sz="1800">
+              <a:rPr lang="pt-BR" sz="1800" dirty="0">
                 <a:solidFill>
                   <a:srgbClr val="333333"/>
                 </a:solidFill>
                 <a:latin typeface="Bahnschrift" pitchFamily="34"/>
                 <a:cs typeface="Tahoma" pitchFamily="2"/>
               </a:rPr>
-              <a:t>Para que um usuário possa realizar também a venda de produtos ele deve genhar o cargo de vendedor.</a:t>
+              <a:t>Para que um usuário possa realizar também a venda de produtos ele deve </a:t>
+            </a:r>
+            <a:r>
+              <a:rPr lang="pt-BR" sz="1800" dirty="0" err="1">
+                <a:solidFill>
+                  <a:srgbClr val="333333"/>
+                </a:solidFill>
+                <a:latin typeface="Bahnschrift" pitchFamily="34"/>
+                <a:cs typeface="Tahoma" pitchFamily="2"/>
+              </a:rPr>
+              <a:t>genhar</a:t>
+            </a:r>
+            <a:r>
+              <a:rPr lang="pt-BR" sz="1800" dirty="0">
+                <a:solidFill>
+                  <a:srgbClr val="333333"/>
+                </a:solidFill>
+                <a:latin typeface="Bahnschrift" pitchFamily="34"/>
+                <a:cs typeface="Tahoma" pitchFamily="2"/>
+              </a:rPr>
+              <a:t> o cargo de vendedor.</a:t>
             </a:r>
           </a:p>
           <a:p>
@@ -41400,7 +41425,7 @@
                 <a:spcPts val="0"/>
               </a:spcBef>
             </a:pPr>
-            <a:endParaRPr lang="pt-BR" sz="1800">
+            <a:endParaRPr lang="pt-BR" sz="1800" dirty="0">
               <a:solidFill>
                 <a:srgbClr val="333333"/>
               </a:solidFill>
@@ -41415,14 +41440,34 @@
               </a:spcBef>
             </a:pPr>
             <a:r>
-              <a:rPr lang="pt-BR" sz="1800">
+              <a:rPr lang="pt-BR" sz="1800" dirty="0">
                 <a:solidFill>
                   <a:srgbClr val="333333"/>
                 </a:solidFill>
                 <a:latin typeface="Bahnschrift" pitchFamily="34"/>
                 <a:cs typeface="Tahoma" pitchFamily="2"/>
               </a:rPr>
-              <a:t>Apenas administradores podem conceder esse cargo, uma vez que o usuário precisa ser selecionado e confiado para que possa vender no marketplace.</a:t>
+              <a:t>Apenas administradores podem conceder esse cargo, uma vez que o usuário precisa ser selecionado e confiado para que possa vender no </a:t>
+            </a:r>
+            <a:r>
+              <a:rPr lang="pt-BR" sz="1800" dirty="0" err="1">
+                <a:solidFill>
+                  <a:srgbClr val="333333"/>
+                </a:solidFill>
+                <a:latin typeface="Bahnschrift" pitchFamily="34"/>
+                <a:cs typeface="Tahoma" pitchFamily="2"/>
+              </a:rPr>
+              <a:t>marketplace</a:t>
+            </a:r>
+            <a:r>
+              <a:rPr lang="pt-BR" sz="1800" dirty="0">
+                <a:solidFill>
+                  <a:srgbClr val="333333"/>
+                </a:solidFill>
+                <a:latin typeface="Bahnschrift" pitchFamily="34"/>
+                <a:cs typeface="Tahoma" pitchFamily="2"/>
+              </a:rPr>
+              <a:t>.</a:t>
             </a:r>
           </a:p>
           <a:p>
@@ -41431,7 +41476,7 @@
                 <a:spcPts val="0"/>
               </a:spcBef>
             </a:pPr>
-            <a:endParaRPr lang="pt-BR" sz="1800">
+            <a:endParaRPr lang="pt-BR" sz="1800" dirty="0">
               <a:solidFill>
                 <a:srgbClr val="333333"/>
               </a:solidFill>
@@ -41446,14 +41491,34 @@
               </a:spcBef>
             </a:pPr>
             <a:r>
-              <a:rPr lang="pt-BR" sz="1800">
+              <a:rPr lang="pt-BR" sz="1800" dirty="0">
                 <a:solidFill>
                   <a:srgbClr val="333333"/>
                 </a:solidFill>
                 <a:latin typeface="Bahnschrift" pitchFamily="34"/>
                 <a:cs typeface="Tahoma" pitchFamily="2"/>
               </a:rPr>
-              <a:t>É possível que o usuário altere a sua senha por meio de um token enviado por email.</a:t>
+              <a:t>É possível que o usuário altere a sua senha por meio de um token enviado por </a:t>
+            </a:r>
+            <a:r>
+              <a:rPr lang="pt-BR" sz="1800" dirty="0" err="1">
+                <a:solidFill>
+                  <a:srgbClr val="333333"/>
+                </a:solidFill>
+                <a:latin typeface="Bahnschrift" pitchFamily="34"/>
+                <a:cs typeface="Tahoma" pitchFamily="2"/>
+              </a:rPr>
+              <a:t>email</a:t>
+            </a:r>
+            <a:r>
+              <a:rPr lang="pt-BR" sz="1800" dirty="0">
+                <a:solidFill>
+                  <a:srgbClr val="333333"/>
+                </a:solidFill>
+                <a:latin typeface="Bahnschrift" pitchFamily="34"/>
+                <a:cs typeface="Tahoma" pitchFamily="2"/>
+              </a:rPr>
+              <a:t>.</a:t>
             </a:r>
           </a:p>
         </p:txBody>
@@ -41467,7 +41532,7 @@
 </file>
 
 <file path=ppt/slides/slide4.xml><?xml version="1.0" encoding="utf-8"?>
-<p:sld xmlns:a="http://schemas.openxmlformats.org/drawingml/2006/main" xmlns:r="http://schemas.openxmlformats.org/officeDocument/2006/relationships" xmlns:p="http://schemas.openxmlformats.org/presentationml/2006/main" show="0">
+<p:sld xmlns:a="http://schemas.openxmlformats.org/drawingml/2006/main" xmlns:r="http://schemas.openxmlformats.org/officeDocument/2006/relationships" xmlns:p="http://schemas.openxmlformats.org/presentationml/2006/main">
   <p:cSld name="page4">
     <p:spTree>
       <p:nvGrpSpPr>
@@ -41723,7 +41788,7 @@
                 <a:latin typeface="Bahnschrift" pitchFamily="34"/>
                 <a:cs typeface="Tahoma" pitchFamily="2"/>
               </a:rPr>
-              <a:t>     As informações recebidas através do Kafka, são armazenadas na tabela CUPOM no bando de dados Oracle.</a:t>
+              <a:t>     As informações recebidas através do Kafka, são armazenadas na tabela CUPOM no banco de dados Oracle.</a:t>
             </a:r>
           </a:p>
           <a:p>
@@ -41806,7 +41871,7 @@
 </file>
 
 <file path=ppt/slides/slide5.xml><?xml version="1.0" encoding="utf-8"?>
-<p:sld xmlns:a="http://schemas.openxmlformats.org/drawingml/2006/main" xmlns:r="http://schemas.openxmlformats.org/officeDocument/2006/relationships" xmlns:p="http://schemas.openxmlformats.org/presentationml/2006/main" show="0">
+<p:sld xmlns:a="http://schemas.openxmlformats.org/drawingml/2006/main" xmlns:r="http://schemas.openxmlformats.org/officeDocument/2006/relationships" xmlns:p="http://schemas.openxmlformats.org/presentationml/2006/main">
   <p:cSld name="page5">
     <p:spTree>
       <p:nvGrpSpPr>
@@ -42040,8 +42105,8 @@
         </p:nvSpPr>
         <p:spPr>
           <a:xfrm>
-            <a:off x="6024716" y="588949"/>
-            <a:ext cx="3939968" cy="3240000"/>
+            <a:off x="5995220" y="1084007"/>
+            <a:ext cx="3939968" cy="2412348"/>
           </a:xfrm>
         </p:spPr>
         <p:txBody>
@@ -42285,7 +42350,7 @@
                 <a:effectLst/>
                 <a:latin typeface="Bahnschrift" panose="020B0502040204020203" pitchFamily="34" charset="0"/>
               </a:rPr>
-              <a:t> padrão entre as aplicações, é convertido para String, adicionado o tópico, a chave aleatória e a partição, após é realizado o build no formato JSON e enviado o </a:t>
+              <a:t> padrão entre as aplicações, é convertido para String, adicionado o tópico, a chave aleatória e a partição, então é realizado o build no formato JSON e enviado o </a:t>
             </a:r>
             <a:r>
               <a:rPr lang="pt-BR" sz="1600" b="0" i="0" dirty="0" err="1">
@@ -42346,7 +42411,7 @@
         </p:blipFill>
         <p:spPr bwMode="auto">
           <a:xfrm>
-            <a:off x="184354" y="233361"/>
+            <a:off x="250720" y="255483"/>
             <a:ext cx="4687700" cy="4464000"/>
           </a:xfrm>
           <a:prstGeom prst="rect">
@@ -42412,7 +42477,7 @@
         </p:nvSpPr>
         <p:spPr>
           <a:xfrm>
-            <a:off x="825910" y="588949"/>
+            <a:off x="470925" y="544704"/>
             <a:ext cx="9138774" cy="3240000"/>
           </a:xfrm>
         </p:spPr>

</xml_diff>